<commit_message>
Correction sur export tabulate
</commit_message>
<xml_diff>
--- a/docs/principes_burmister.pptx
+++ b/docs/principes_burmister.pptx
@@ -2964,69 +2964,167 @@
           <a:chExt cx="0" cy="0"/>
         </a:xfrm>
       </p:grpSpPr>
-      <p:sp>
-        <p:nvSpPr>
-          <p:cNvPr id="4" name="Rectangle 2"/>
-          <p:cNvSpPr>
-            <a:spLocks noChangeArrowheads="1"/>
-          </p:cNvSpPr>
+      <p:grpSp>
+        <p:nvGrpSpPr>
+          <p:cNvPr id="1027" name="Groupe 1026"/>
+          <p:cNvGrpSpPr/>
           <p:nvPr/>
-        </p:nvSpPr>
-        <p:spPr bwMode="auto">
+        </p:nvGrpSpPr>
+        <p:grpSpPr>
           <a:xfrm>
-            <a:off x="2113472" y="914400"/>
-            <a:ext cx="12192000" cy="0"/>
+            <a:off x="9264770" y="1500996"/>
+            <a:ext cx="1388853" cy="1181819"/>
+            <a:chOff x="9264770" y="1500996"/>
+            <a:chExt cx="1388853" cy="1181819"/>
           </a:xfrm>
-          <a:prstGeom prst="rect">
-            <a:avLst/>
-          </a:prstGeom>
-          <a:noFill/>
-          <a:ln>
-            <a:noFill/>
-          </a:ln>
-          <a:effectLst/>
-          <a:extLst>
-            <a:ext uri="{909E8E84-426E-40DD-AFC4-6F175D3DCCD1}">
-              <a14:hiddenFill xmlns:a14="http://schemas.microsoft.com/office/drawing/2010/main">
-                <a:solidFill>
-                  <a:schemeClr val="accent1"/>
-                </a:solidFill>
-              </a14:hiddenFill>
-            </a:ext>
-            <a:ext uri="{91240B29-F687-4F45-9708-019B960494DF}">
-              <a14:hiddenLine xmlns:a14="http://schemas.microsoft.com/office/drawing/2010/main" w="9525">
-                <a:solidFill>
-                  <a:schemeClr val="tx1"/>
-                </a:solidFill>
-                <a:miter lim="800000"/>
-                <a:headEnd/>
-                <a:tailEnd/>
-              </a14:hiddenLine>
-            </a:ext>
-            <a:ext uri="{AF507438-7753-43E0-B8FC-AC1667EBCBE1}">
-              <a14:hiddenEffects xmlns:a14="http://schemas.microsoft.com/office/drawing/2010/main">
-                <a:effectLst>
-                  <a:outerShdw dist="35921" dir="2700000" algn="ctr" rotWithShape="0">
-                    <a:schemeClr val="bg2"/>
-                  </a:outerShdw>
-                </a:effectLst>
-              </a14:hiddenEffects>
-            </a:ext>
-          </a:extLst>
-        </p:spPr>
-        <p:txBody>
-          <a:bodyPr vert="horz" wrap="none" lIns="91440" tIns="45720" rIns="91440" bIns="45720" numCol="1" anchor="ctr" anchorCtr="0" compatLnSpc="1">
-            <a:prstTxWarp prst="textNoShape">
+        </p:grpSpPr>
+        <p:sp>
+          <p:nvSpPr>
+            <p:cNvPr id="8" name="Ellipse 7"/>
+            <p:cNvSpPr/>
+            <p:nvPr/>
+          </p:nvSpPr>
+          <p:spPr>
+            <a:xfrm>
+              <a:off x="9264770" y="2303253"/>
+              <a:ext cx="379562" cy="379562"/>
+            </a:xfrm>
+            <a:prstGeom prst="ellipse">
               <a:avLst/>
-            </a:prstTxWarp>
-            <a:spAutoFit/>
-          </a:bodyPr>
-          <a:lstStyle/>
-          <a:p>
-            <a:endParaRPr lang="fr-FR"/>
-          </a:p>
-        </p:txBody>
-      </p:sp>
+            </a:prstGeom>
+          </p:spPr>
+          <p:style>
+            <a:lnRef idx="2">
+              <a:schemeClr val="accent1">
+                <a:shade val="50000"/>
+              </a:schemeClr>
+            </a:lnRef>
+            <a:fillRef idx="1">
+              <a:schemeClr val="accent1"/>
+            </a:fillRef>
+            <a:effectRef idx="0">
+              <a:schemeClr val="accent1"/>
+            </a:effectRef>
+            <a:fontRef idx="minor">
+              <a:schemeClr val="lt1"/>
+            </a:fontRef>
+          </p:style>
+          <p:txBody>
+            <a:bodyPr rtlCol="0" anchor="ctr"/>
+            <a:lstStyle/>
+            <a:p>
+              <a:pPr algn="ctr"/>
+              <a:endParaRPr lang="fr-FR"/>
+            </a:p>
+          </p:txBody>
+        </p:sp>
+        <p:sp>
+          <p:nvSpPr>
+            <p:cNvPr id="10" name="Ellipse 9"/>
+            <p:cNvSpPr/>
+            <p:nvPr/>
+          </p:nvSpPr>
+          <p:spPr>
+            <a:xfrm>
+              <a:off x="9849449" y="2303253"/>
+              <a:ext cx="379562" cy="379562"/>
+            </a:xfrm>
+            <a:prstGeom prst="ellipse">
+              <a:avLst/>
+            </a:prstGeom>
+          </p:spPr>
+          <p:style>
+            <a:lnRef idx="2">
+              <a:schemeClr val="accent1">
+                <a:shade val="50000"/>
+              </a:schemeClr>
+            </a:lnRef>
+            <a:fillRef idx="1">
+              <a:schemeClr val="accent1"/>
+            </a:fillRef>
+            <a:effectRef idx="0">
+              <a:schemeClr val="accent1"/>
+            </a:effectRef>
+            <a:fontRef idx="minor">
+              <a:schemeClr val="lt1"/>
+            </a:fontRef>
+          </p:style>
+          <p:txBody>
+            <a:bodyPr rtlCol="0" anchor="ctr"/>
+            <a:lstStyle/>
+            <a:p>
+              <a:pPr algn="ctr"/>
+              <a:endParaRPr lang="fr-FR"/>
+            </a:p>
+          </p:txBody>
+        </p:sp>
+        <p:cxnSp>
+          <p:nvCxnSpPr>
+            <p:cNvPr id="11" name="Connecteur droit avec flèche 10"/>
+            <p:cNvCxnSpPr/>
+            <p:nvPr/>
+          </p:nvCxnSpPr>
+          <p:spPr>
+            <a:xfrm flipV="1">
+              <a:off x="9454551" y="2493034"/>
+              <a:ext cx="1199072" cy="8626"/>
+            </a:xfrm>
+            <a:prstGeom prst="straightConnector1">
+              <a:avLst/>
+            </a:prstGeom>
+            <a:ln>
+              <a:tailEnd type="triangle"/>
+            </a:ln>
+          </p:spPr>
+          <p:style>
+            <a:lnRef idx="1">
+              <a:schemeClr val="accent1"/>
+            </a:lnRef>
+            <a:fillRef idx="0">
+              <a:schemeClr val="accent1"/>
+            </a:fillRef>
+            <a:effectRef idx="0">
+              <a:schemeClr val="accent1"/>
+            </a:effectRef>
+            <a:fontRef idx="minor">
+              <a:schemeClr val="tx1"/>
+            </a:fontRef>
+          </p:style>
+        </p:cxnSp>
+        <p:cxnSp>
+          <p:nvCxnSpPr>
+            <p:cNvPr id="14" name="Connecteur droit avec flèche 13"/>
+            <p:cNvCxnSpPr/>
+            <p:nvPr/>
+          </p:nvCxnSpPr>
+          <p:spPr>
+            <a:xfrm flipV="1">
+              <a:off x="9454551" y="1500996"/>
+              <a:ext cx="0" cy="1000665"/>
+            </a:xfrm>
+            <a:prstGeom prst="straightConnector1">
+              <a:avLst/>
+            </a:prstGeom>
+            <a:ln>
+              <a:tailEnd type="triangle"/>
+            </a:ln>
+          </p:spPr>
+          <p:style>
+            <a:lnRef idx="1">
+              <a:schemeClr val="accent1"/>
+            </a:lnRef>
+            <a:fillRef idx="0">
+              <a:schemeClr val="accent1"/>
+            </a:fillRef>
+            <a:effectRef idx="0">
+              <a:schemeClr val="accent1"/>
+            </a:effectRef>
+            <a:fontRef idx="minor">
+              <a:schemeClr val="tx1"/>
+            </a:fontRef>
+          </p:style>
+        </p:cxnSp>
+      </p:grpSp>
       <p:pic>
         <p:nvPicPr>
           <p:cNvPr id="1025" name="Picture 1"/>
@@ -3050,7 +3148,7 @@
         </p:blipFill>
         <p:spPr bwMode="auto">
           <a:xfrm>
-            <a:off x="2113472" y="914400"/>
+            <a:off x="2143305" y="664234"/>
             <a:ext cx="5353050" cy="2371725"/>
           </a:xfrm>
           <a:prstGeom prst="rect">
@@ -3077,14 +3175,14 @@
           <p:nvPr>
             <p:extLst>
               <p:ext uri="{D42A27DB-BD31-4B8C-83A1-F6EECF244321}">
-                <p14:modId xmlns:p14="http://schemas.microsoft.com/office/powerpoint/2010/main" val="3877914726"/>
+                <p14:modId xmlns:p14="http://schemas.microsoft.com/office/powerpoint/2010/main" val="3205607847"/>
               </p:ext>
             </p:extLst>
           </p:nvPr>
         </p:nvGraphicFramePr>
         <p:xfrm>
-          <a:off x="1911230" y="3713032"/>
-          <a:ext cx="8128000" cy="2595880"/>
+          <a:off x="2027267" y="3462866"/>
+          <a:ext cx="5585125" cy="2865120"/>
         </p:xfrm>
         <a:graphic>
           <a:graphicData uri="http://schemas.openxmlformats.org/drawingml/2006/table">
@@ -3093,14 +3191,14 @@
                 <a:tableStyleId>{5C22544A-7EE6-4342-B048-85BDC9FD1C3A}</a:tableStyleId>
               </a:tblPr>
               <a:tblGrid>
-                <a:gridCol w="4064000">
+                <a:gridCol w="3385389">
                   <a:extLst>
                     <a:ext uri="{9D8B030D-6E8A-4147-A177-3AD203B41FA5}">
                       <a16:colId xmlns:a16="http://schemas.microsoft.com/office/drawing/2014/main" val="2687620292"/>
                     </a:ext>
                   </a:extLst>
                 </a:gridCol>
-                <a:gridCol w="4064000">
+                <a:gridCol w="2199736">
                   <a:extLst>
                     <a:ext uri="{9D8B030D-6E8A-4147-A177-3AD203B41FA5}">
                       <a16:colId xmlns:a16="http://schemas.microsoft.com/office/drawing/2014/main" val="4035572122"/>
@@ -3114,6 +3212,7 @@
                     <a:bodyPr/>
                     <a:lstStyle/>
                     <a:p>
+                      <a:pPr algn="ctr"/>
                       <a:r>
                         <a:rPr lang="fr-FR" dirty="0" smtClean="0"/>
                         <a:t>Sollicitation</a:t>
@@ -3128,6 +3227,7 @@
                     <a:bodyPr/>
                     <a:lstStyle/>
                     <a:p>
+                      <a:pPr algn="ctr"/>
                       <a:r>
                         <a:rPr lang="fr-FR" dirty="0" smtClean="0"/>
                         <a:t>Addition / soustraction</a:t>
@@ -3163,6 +3263,7 @@
                     <a:bodyPr/>
                     <a:lstStyle/>
                     <a:p>
+                      <a:pPr algn="ctr"/>
                       <a:r>
                         <a:rPr lang="fr-FR" dirty="0" smtClean="0"/>
                         <a:t>+</a:t>
@@ -3202,6 +3303,7 @@
                     <a:bodyPr/>
                     <a:lstStyle/>
                     <a:p>
+                      <a:pPr algn="ctr"/>
                       <a:r>
                         <a:rPr lang="fr-FR" dirty="0" smtClean="0"/>
                         <a:t>-</a:t>
@@ -3241,6 +3343,7 @@
                     <a:bodyPr/>
                     <a:lstStyle/>
                     <a:p>
+                      <a:pPr algn="ctr"/>
                       <a:r>
                         <a:rPr lang="fr-FR" dirty="0" smtClean="0"/>
                         <a:t>+</a:t>
@@ -3280,6 +3383,7 @@
                     <a:bodyPr/>
                     <a:lstStyle/>
                     <a:p>
+                      <a:pPr algn="ctr"/>
                       <a:r>
                         <a:rPr lang="fr-FR" dirty="0" smtClean="0"/>
                         <a:t>+</a:t>
@@ -3319,6 +3423,7 @@
                     <a:bodyPr/>
                     <a:lstStyle/>
                     <a:p>
+                      <a:pPr algn="ctr"/>
                       <a:r>
                         <a:rPr lang="fr-FR" dirty="0" smtClean="0"/>
                         <a:t>+</a:t>
@@ -3354,6 +3459,7 @@
                     <a:bodyPr/>
                     <a:lstStyle/>
                     <a:p>
+                      <a:pPr algn="ctr"/>
                       <a:r>
                         <a:rPr lang="fr-FR" dirty="0" smtClean="0"/>
                         <a:t>-</a:t>
@@ -3375,18 +3481,29 @@
       </p:graphicFrame>
       <p:sp>
         <p:nvSpPr>
-          <p:cNvPr id="8" name="Ellipse 7"/>
+          <p:cNvPr id="19" name="Flèche droite 18"/>
           <p:cNvSpPr/>
           <p:nvPr/>
         </p:nvSpPr>
         <p:spPr>
-          <a:xfrm>
-            <a:off x="9264770" y="2303253"/>
-            <a:ext cx="379562" cy="379562"/>
+          <a:xfrm rot="16200000">
+            <a:off x="9302572" y="1067137"/>
+            <a:ext cx="955615" cy="232913"/>
           </a:xfrm>
-          <a:prstGeom prst="ellipse">
-            <a:avLst/>
+          <a:prstGeom prst="rightArrow">
+            <a:avLst>
+              <a:gd name="adj1" fmla="val 13265"/>
+              <a:gd name="adj2" fmla="val 106271"/>
+            </a:avLst>
           </a:prstGeom>
+          <a:solidFill>
+            <a:srgbClr val="FFC000"/>
+          </a:solidFill>
+          <a:ln>
+            <a:solidFill>
+              <a:schemeClr val="accent2"/>
+            </a:solidFill>
+          </a:ln>
         </p:spPr>
         <p:style>
           <a:lnRef idx="2">
@@ -3413,155 +3530,320 @@
           </a:p>
         </p:txBody>
       </p:sp>
-      <p:sp>
-        <p:nvSpPr>
-          <p:cNvPr id="10" name="Ellipse 9"/>
-          <p:cNvSpPr/>
+      <p:grpSp>
+        <p:nvGrpSpPr>
+          <p:cNvPr id="1026" name="Groupe 1025"/>
+          <p:cNvGrpSpPr/>
           <p:nvPr/>
-        </p:nvSpPr>
-        <p:spPr>
+        </p:nvGrpSpPr>
+        <p:grpSpPr>
           <a:xfrm>
-            <a:off x="9849449" y="2303253"/>
-            <a:ext cx="379562" cy="379562"/>
+            <a:off x="8510347" y="1751745"/>
+            <a:ext cx="2014688" cy="1374558"/>
+            <a:chOff x="6745975" y="1432464"/>
+            <a:chExt cx="2014688" cy="1374558"/>
           </a:xfrm>
-          <a:prstGeom prst="ellipse">
-            <a:avLst/>
-          </a:prstGeom>
-        </p:spPr>
-        <p:style>
-          <a:lnRef idx="2">
-            <a:schemeClr val="accent1">
-              <a:shade val="50000"/>
-            </a:schemeClr>
-          </a:lnRef>
-          <a:fillRef idx="1">
-            <a:schemeClr val="accent1"/>
-          </a:fillRef>
-          <a:effectRef idx="0">
-            <a:schemeClr val="accent1"/>
-          </a:effectRef>
-          <a:fontRef idx="minor">
-            <a:schemeClr val="lt1"/>
-          </a:fontRef>
-        </p:style>
-        <p:txBody>
-          <a:bodyPr rtlCol="0" anchor="ctr"/>
-          <a:lstStyle/>
-          <a:p>
-            <a:pPr algn="ctr"/>
-            <a:endParaRPr lang="fr-FR"/>
-          </a:p>
-        </p:txBody>
-      </p:sp>
-      <p:cxnSp>
-        <p:nvCxnSpPr>
-          <p:cNvPr id="11" name="Connecteur droit avec flèche 10"/>
-          <p:cNvCxnSpPr/>
-          <p:nvPr/>
-        </p:nvCxnSpPr>
-        <p:spPr>
-          <a:xfrm flipV="1">
-            <a:off x="9454551" y="2493034"/>
-            <a:ext cx="1199072" cy="8626"/>
-          </a:xfrm>
-          <a:prstGeom prst="straightConnector1">
-            <a:avLst/>
-          </a:prstGeom>
-          <a:ln>
-            <a:tailEnd type="triangle"/>
-          </a:ln>
-        </p:spPr>
-        <p:style>
-          <a:lnRef idx="1">
-            <a:schemeClr val="accent1"/>
-          </a:lnRef>
-          <a:fillRef idx="0">
-            <a:schemeClr val="accent1"/>
-          </a:fillRef>
-          <a:effectRef idx="0">
-            <a:schemeClr val="accent1"/>
-          </a:effectRef>
-          <a:fontRef idx="minor">
-            <a:schemeClr val="tx1"/>
-          </a:fontRef>
-        </p:style>
-      </p:cxnSp>
-      <p:cxnSp>
-        <p:nvCxnSpPr>
-          <p:cNvPr id="14" name="Connecteur droit avec flèche 13"/>
-          <p:cNvCxnSpPr/>
-          <p:nvPr/>
-        </p:nvCxnSpPr>
-        <p:spPr>
-          <a:xfrm flipV="1">
-            <a:off x="9454551" y="1500996"/>
-            <a:ext cx="0" cy="1000665"/>
-          </a:xfrm>
-          <a:prstGeom prst="straightConnector1">
-            <a:avLst/>
-          </a:prstGeom>
-          <a:ln>
-            <a:tailEnd type="triangle"/>
-          </a:ln>
-        </p:spPr>
-        <p:style>
-          <a:lnRef idx="1">
-            <a:schemeClr val="accent1"/>
-          </a:lnRef>
-          <a:fillRef idx="0">
-            <a:schemeClr val="accent1"/>
-          </a:fillRef>
-          <a:effectRef idx="0">
-            <a:schemeClr val="accent1"/>
-          </a:effectRef>
-          <a:fontRef idx="minor">
-            <a:schemeClr val="tx1"/>
-          </a:fontRef>
-        </p:style>
-      </p:cxnSp>
-      <p:sp>
-        <p:nvSpPr>
-          <p:cNvPr id="19" name="Flèche droite 18"/>
-          <p:cNvSpPr/>
-          <p:nvPr/>
-        </p:nvSpPr>
-        <p:spPr>
-          <a:xfrm rot="16200000">
-            <a:off x="9255185" y="1372879"/>
-            <a:ext cx="955615" cy="232913"/>
-          </a:xfrm>
-          <a:prstGeom prst="rightArrow">
-            <a:avLst>
-              <a:gd name="adj1" fmla="val 13265"/>
-              <a:gd name="adj2" fmla="val 106271"/>
-            </a:avLst>
-          </a:prstGeom>
-        </p:spPr>
-        <p:style>
-          <a:lnRef idx="2">
-            <a:schemeClr val="accent1">
-              <a:shade val="50000"/>
-            </a:schemeClr>
-          </a:lnRef>
-          <a:fillRef idx="1">
-            <a:schemeClr val="accent1"/>
-          </a:fillRef>
-          <a:effectRef idx="0">
-            <a:schemeClr val="accent1"/>
-          </a:effectRef>
-          <a:fontRef idx="minor">
-            <a:schemeClr val="lt1"/>
-          </a:fontRef>
-        </p:style>
-        <p:txBody>
-          <a:bodyPr rtlCol="0" anchor="ctr"/>
-          <a:lstStyle/>
-          <a:p>
-            <a:pPr algn="ctr"/>
-            <a:endParaRPr lang="fr-FR"/>
-          </a:p>
-        </p:txBody>
-      </p:sp>
+        </p:grpSpPr>
+        <p:cxnSp>
+          <p:nvCxnSpPr>
+            <p:cNvPr id="29" name="Connecteur droit 28"/>
+            <p:cNvCxnSpPr/>
+            <p:nvPr/>
+          </p:nvCxnSpPr>
+          <p:spPr>
+            <a:xfrm flipV="1">
+              <a:off x="6745975" y="2177455"/>
+              <a:ext cx="1958077" cy="1"/>
+            </a:xfrm>
+            <a:prstGeom prst="line">
+              <a:avLst/>
+            </a:prstGeom>
+            <a:ln>
+              <a:solidFill>
+                <a:schemeClr val="bg2">
+                  <a:lumMod val="75000"/>
+                </a:schemeClr>
+              </a:solidFill>
+              <a:prstDash val="sysDash"/>
+            </a:ln>
+          </p:spPr>
+          <p:style>
+            <a:lnRef idx="1">
+              <a:schemeClr val="accent1"/>
+            </a:lnRef>
+            <a:fillRef idx="0">
+              <a:schemeClr val="accent1"/>
+            </a:fillRef>
+            <a:effectRef idx="0">
+              <a:schemeClr val="accent1"/>
+            </a:effectRef>
+            <a:fontRef idx="minor">
+              <a:schemeClr val="tx1"/>
+            </a:fontRef>
+          </p:style>
+        </p:cxnSp>
+        <p:grpSp>
+          <p:nvGrpSpPr>
+            <p:cNvPr id="27" name="Groupe 26"/>
+            <p:cNvGrpSpPr/>
+            <p:nvPr/>
+          </p:nvGrpSpPr>
+          <p:grpSpPr>
+            <a:xfrm>
+              <a:off x="8007769" y="1667752"/>
+              <a:ext cx="752894" cy="641852"/>
+              <a:chOff x="8098467" y="1573098"/>
+              <a:chExt cx="752894" cy="641852"/>
+            </a:xfrm>
+          </p:grpSpPr>
+          <p:cxnSp>
+            <p:nvCxnSpPr>
+              <p:cNvPr id="21" name="Connecteur droit avec flèche 20"/>
+              <p:cNvCxnSpPr/>
+              <p:nvPr/>
+            </p:nvCxnSpPr>
+            <p:spPr>
+              <a:xfrm flipH="1" flipV="1">
+                <a:off x="8286211" y="1856447"/>
+                <a:ext cx="6350" cy="220004"/>
+              </a:xfrm>
+              <a:prstGeom prst="straightConnector1">
+                <a:avLst/>
+              </a:prstGeom>
+              <a:ln>
+                <a:solidFill>
+                  <a:srgbClr val="FF0000"/>
+                </a:solidFill>
+                <a:tailEnd type="triangle"/>
+              </a:ln>
+            </p:spPr>
+            <p:style>
+              <a:lnRef idx="1">
+                <a:schemeClr val="accent1"/>
+              </a:lnRef>
+              <a:fillRef idx="0">
+                <a:schemeClr val="accent1"/>
+              </a:fillRef>
+              <a:effectRef idx="0">
+                <a:schemeClr val="accent1"/>
+              </a:effectRef>
+              <a:fontRef idx="minor">
+                <a:schemeClr val="tx1"/>
+              </a:fontRef>
+            </p:style>
+          </p:cxnSp>
+          <p:cxnSp>
+            <p:nvCxnSpPr>
+              <p:cNvPr id="23" name="Connecteur droit avec flèche 22"/>
+              <p:cNvCxnSpPr/>
+              <p:nvPr/>
+            </p:nvCxnSpPr>
+            <p:spPr>
+              <a:xfrm>
+                <a:off x="8292561" y="2082801"/>
+                <a:ext cx="212306" cy="0"/>
+              </a:xfrm>
+              <a:prstGeom prst="straightConnector1">
+                <a:avLst/>
+              </a:prstGeom>
+              <a:ln>
+                <a:solidFill>
+                  <a:srgbClr val="FF0000"/>
+                </a:solidFill>
+                <a:tailEnd type="triangle"/>
+              </a:ln>
+            </p:spPr>
+            <p:style>
+              <a:lnRef idx="1">
+                <a:schemeClr val="accent1"/>
+              </a:lnRef>
+              <a:fillRef idx="0">
+                <a:schemeClr val="accent1"/>
+              </a:fillRef>
+              <a:effectRef idx="0">
+                <a:schemeClr val="accent1"/>
+              </a:effectRef>
+              <a:fontRef idx="minor">
+                <a:schemeClr val="tx1"/>
+              </a:fontRef>
+            </p:style>
+          </p:cxnSp>
+          <p:sp>
+            <p:nvSpPr>
+              <p:cNvPr id="24" name="ZoneTexte 23"/>
+              <p:cNvSpPr txBox="1"/>
+              <p:nvPr/>
+            </p:nvSpPr>
+            <p:spPr>
+              <a:xfrm>
+                <a:off x="8098467" y="1573098"/>
+                <a:ext cx="406400" cy="276999"/>
+              </a:xfrm>
+              <a:prstGeom prst="rect">
+                <a:avLst/>
+              </a:prstGeom>
+              <a:noFill/>
+            </p:spPr>
+            <p:txBody>
+              <a:bodyPr wrap="square" rtlCol="0">
+                <a:spAutoFit/>
+              </a:bodyPr>
+              <a:lstStyle/>
+              <a:p>
+                <a:r>
+                  <a:rPr lang="fr-FR" sz="1200" dirty="0" smtClean="0">
+                    <a:solidFill>
+                      <a:srgbClr val="FF0000"/>
+                    </a:solidFill>
+                    <a:latin typeface="Symbol" panose="05050102010706020507" pitchFamily="18" charset="2"/>
+                  </a:rPr>
+                  <a:t>s</a:t>
+                </a:r>
+                <a:r>
+                  <a:rPr lang="fr-FR" sz="1200" dirty="0" smtClean="0">
+                    <a:solidFill>
+                      <a:srgbClr val="FF0000"/>
+                    </a:solidFill>
+                  </a:rPr>
+                  <a:t>t</a:t>
+                </a:r>
+                <a:endParaRPr lang="fr-FR" sz="1200" dirty="0">
+                  <a:solidFill>
+                    <a:srgbClr val="FF0000"/>
+                  </a:solidFill>
+                </a:endParaRPr>
+              </a:p>
+            </p:txBody>
+          </p:sp>
+          <p:sp>
+            <p:nvSpPr>
+              <p:cNvPr id="26" name="ZoneTexte 25"/>
+              <p:cNvSpPr txBox="1"/>
+              <p:nvPr/>
+            </p:nvSpPr>
+            <p:spPr>
+              <a:xfrm>
+                <a:off x="8444961" y="1937951"/>
+                <a:ext cx="406400" cy="276999"/>
+              </a:xfrm>
+              <a:prstGeom prst="rect">
+                <a:avLst/>
+              </a:prstGeom>
+              <a:noFill/>
+            </p:spPr>
+            <p:txBody>
+              <a:bodyPr wrap="square" rtlCol="0">
+                <a:spAutoFit/>
+              </a:bodyPr>
+              <a:lstStyle/>
+              <a:p>
+                <a:r>
+                  <a:rPr lang="fr-FR" sz="1200" dirty="0" smtClean="0">
+                    <a:solidFill>
+                      <a:srgbClr val="FF0000"/>
+                    </a:solidFill>
+                    <a:latin typeface="Symbol" panose="05050102010706020507" pitchFamily="18" charset="2"/>
+                  </a:rPr>
+                  <a:t>s</a:t>
+                </a:r>
+                <a:r>
+                  <a:rPr lang="fr-FR" sz="1200" dirty="0">
+                    <a:solidFill>
+                      <a:srgbClr val="FF0000"/>
+                    </a:solidFill>
+                  </a:rPr>
+                  <a:t>r</a:t>
+                </a:r>
+              </a:p>
+            </p:txBody>
+          </p:sp>
+        </p:grpSp>
+        <p:sp>
+          <p:nvSpPr>
+            <p:cNvPr id="25" name="Ellipse 24"/>
+            <p:cNvSpPr/>
+            <p:nvPr/>
+          </p:nvSpPr>
+          <p:spPr>
+            <a:xfrm>
+              <a:off x="7185923" y="1673764"/>
+              <a:ext cx="1009051" cy="1009051"/>
+            </a:xfrm>
+            <a:prstGeom prst="ellipse">
+              <a:avLst/>
+            </a:prstGeom>
+            <a:noFill/>
+            <a:ln>
+              <a:solidFill>
+                <a:schemeClr val="tx1"/>
+              </a:solidFill>
+              <a:prstDash val="sysDash"/>
+            </a:ln>
+          </p:spPr>
+          <p:style>
+            <a:lnRef idx="2">
+              <a:schemeClr val="accent1">
+                <a:shade val="50000"/>
+              </a:schemeClr>
+            </a:lnRef>
+            <a:fillRef idx="1">
+              <a:schemeClr val="accent1"/>
+            </a:fillRef>
+            <a:effectRef idx="0">
+              <a:schemeClr val="accent1"/>
+            </a:effectRef>
+            <a:fontRef idx="minor">
+              <a:schemeClr val="lt1"/>
+            </a:fontRef>
+          </p:style>
+          <p:txBody>
+            <a:bodyPr rtlCol="0" anchor="ctr"/>
+            <a:lstStyle/>
+            <a:p>
+              <a:pPr algn="ctr"/>
+              <a:endParaRPr lang="fr-FR"/>
+            </a:p>
+          </p:txBody>
+        </p:sp>
+        <p:cxnSp>
+          <p:nvCxnSpPr>
+            <p:cNvPr id="31" name="Connecteur droit 30"/>
+            <p:cNvCxnSpPr/>
+            <p:nvPr/>
+          </p:nvCxnSpPr>
+          <p:spPr>
+            <a:xfrm flipV="1">
+              <a:off x="7686135" y="1432464"/>
+              <a:ext cx="4313" cy="1374558"/>
+            </a:xfrm>
+            <a:prstGeom prst="line">
+              <a:avLst/>
+            </a:prstGeom>
+            <a:ln>
+              <a:solidFill>
+                <a:schemeClr val="bg2">
+                  <a:lumMod val="75000"/>
+                </a:schemeClr>
+              </a:solidFill>
+              <a:prstDash val="sysDash"/>
+            </a:ln>
+          </p:spPr>
+          <p:style>
+            <a:lnRef idx="1">
+              <a:schemeClr val="accent1"/>
+            </a:lnRef>
+            <a:fillRef idx="0">
+              <a:schemeClr val="accent1"/>
+            </a:fillRef>
+            <a:effectRef idx="0">
+              <a:schemeClr val="accent1"/>
+            </a:effectRef>
+            <a:fontRef idx="minor">
+              <a:schemeClr val="tx1"/>
+            </a:fontRef>
+          </p:style>
+        </p:cxnSp>
+      </p:grpSp>
     </p:spTree>
     <p:extLst>
       <p:ext uri="{BB962C8B-B14F-4D97-AF65-F5344CB8AC3E}">
@@ -4122,7 +4404,6 @@
 <file path=customXml/itemProps3.xml><?xml version="1.0" encoding="utf-8"?>
 <ds:datastoreItem xmlns:ds="http://schemas.openxmlformats.org/officeDocument/2006/customXml" ds:itemID="{C8A97D56-E45D-459A-BADC-382BA4C85AD7}">
   <ds:schemaRefs>
-    <ds:schemaRef ds:uri="http://schemas.microsoft.com/office/infopath/2007/PartnerControls"/>
     <ds:schemaRef ds:uri="http://purl.org/dc/elements/1.1/"/>
     <ds:schemaRef ds:uri="http://schemas.microsoft.com/office/2006/metadata/properties"/>
     <ds:schemaRef ds:uri="140a38ea-9f47-4842-81d5-06b0dd2885bf"/>
@@ -4130,6 +4411,7 @@
     <ds:schemaRef ds:uri="http://schemas.openxmlformats.org/package/2006/metadata/core-properties"/>
     <ds:schemaRef ds:uri="e1a1d82c-0992-4cb8-94d7-7f7c4d36b294"/>
     <ds:schemaRef ds:uri="http://schemas.microsoft.com/office/2006/documentManagement/types"/>
+    <ds:schemaRef ds:uri="http://schemas.microsoft.com/office/infopath/2007/PartnerControls"/>
     <ds:schemaRef ds:uri="http://www.w3.org/XML/1998/namespace"/>
     <ds:schemaRef ds:uri="http://purl.org/dc/dcmitype/"/>
   </ds:schemaRefs>

</xml_diff>

<commit_message>
fix bug in A B C D
</commit_message>
<xml_diff>
--- a/docs/principes_burmister.pptx
+++ b/docs/principes_burmister.pptx
@@ -6,9 +6,12 @@
   </p:sldMasterIdLst>
   <p:sldIdLst>
     <p:sldId id="256" r:id="rId5"/>
+    <p:sldId id="257" r:id="rId6"/>
+    <p:sldId id="258" r:id="rId7"/>
+    <p:sldId id="259" r:id="rId8"/>
   </p:sldIdLst>
   <p:sldSz cx="12192000" cy="6858000"/>
-  <p:notesSz cx="6858000" cy="9144000"/>
+  <p:notesSz cx="7099300" cy="10234613"/>
   <p:defaultTextStyle>
     <a:defPPr>
       <a:defRPr lang="fr-FR"/>
@@ -104,6 +107,11 @@
       </a:defRPr>
     </a:lvl9pPr>
   </p:defaultTextStyle>
+  <p:extLst>
+    <p:ext uri="{EFAFB233-063F-42B5-8137-9DF3F51BA10A}">
+      <p15:sldGuideLst xmlns:p15="http://schemas.microsoft.com/office/powerpoint/2012/main"/>
+    </p:ext>
+  </p:extLst>
 </p:presentation>
 </file>
 
@@ -238,7 +246,7 @@
           <a:p>
             <a:fld id="{2FB4C272-3672-43E7-9A16-0CD0E3690E2B}" type="datetimeFigureOut">
               <a:rPr lang="fr-FR" smtClean="0"/>
-              <a:t>04/11/2025</a:t>
+              <a:t>09/11/2025</a:t>
             </a:fld>
             <a:endParaRPr lang="fr-FR"/>
           </a:p>
@@ -408,7 +416,7 @@
           <a:p>
             <a:fld id="{2FB4C272-3672-43E7-9A16-0CD0E3690E2B}" type="datetimeFigureOut">
               <a:rPr lang="fr-FR" smtClean="0"/>
-              <a:t>04/11/2025</a:t>
+              <a:t>09/11/2025</a:t>
             </a:fld>
             <a:endParaRPr lang="fr-FR"/>
           </a:p>
@@ -588,7 +596,7 @@
           <a:p>
             <a:fld id="{2FB4C272-3672-43E7-9A16-0CD0E3690E2B}" type="datetimeFigureOut">
               <a:rPr lang="fr-FR" smtClean="0"/>
-              <a:t>04/11/2025</a:t>
+              <a:t>09/11/2025</a:t>
             </a:fld>
             <a:endParaRPr lang="fr-FR"/>
           </a:p>
@@ -758,7 +766,7 @@
           <a:p>
             <a:fld id="{2FB4C272-3672-43E7-9A16-0CD0E3690E2B}" type="datetimeFigureOut">
               <a:rPr lang="fr-FR" smtClean="0"/>
-              <a:t>04/11/2025</a:t>
+              <a:t>09/11/2025</a:t>
             </a:fld>
             <a:endParaRPr lang="fr-FR"/>
           </a:p>
@@ -1004,7 +1012,7 @@
           <a:p>
             <a:fld id="{2FB4C272-3672-43E7-9A16-0CD0E3690E2B}" type="datetimeFigureOut">
               <a:rPr lang="fr-FR" smtClean="0"/>
-              <a:t>04/11/2025</a:t>
+              <a:t>09/11/2025</a:t>
             </a:fld>
             <a:endParaRPr lang="fr-FR"/>
           </a:p>
@@ -1236,7 +1244,7 @@
           <a:p>
             <a:fld id="{2FB4C272-3672-43E7-9A16-0CD0E3690E2B}" type="datetimeFigureOut">
               <a:rPr lang="fr-FR" smtClean="0"/>
-              <a:t>04/11/2025</a:t>
+              <a:t>09/11/2025</a:t>
             </a:fld>
             <a:endParaRPr lang="fr-FR"/>
           </a:p>
@@ -1603,7 +1611,7 @@
           <a:p>
             <a:fld id="{2FB4C272-3672-43E7-9A16-0CD0E3690E2B}" type="datetimeFigureOut">
               <a:rPr lang="fr-FR" smtClean="0"/>
-              <a:t>04/11/2025</a:t>
+              <a:t>09/11/2025</a:t>
             </a:fld>
             <a:endParaRPr lang="fr-FR"/>
           </a:p>
@@ -1721,7 +1729,7 @@
           <a:p>
             <a:fld id="{2FB4C272-3672-43E7-9A16-0CD0E3690E2B}" type="datetimeFigureOut">
               <a:rPr lang="fr-FR" smtClean="0"/>
-              <a:t>04/11/2025</a:t>
+              <a:t>09/11/2025</a:t>
             </a:fld>
             <a:endParaRPr lang="fr-FR"/>
           </a:p>
@@ -1816,7 +1824,7 @@
           <a:p>
             <a:fld id="{2FB4C272-3672-43E7-9A16-0CD0E3690E2B}" type="datetimeFigureOut">
               <a:rPr lang="fr-FR" smtClean="0"/>
-              <a:t>04/11/2025</a:t>
+              <a:t>09/11/2025</a:t>
             </a:fld>
             <a:endParaRPr lang="fr-FR"/>
           </a:p>
@@ -2093,7 +2101,7 @@
           <a:p>
             <a:fld id="{2FB4C272-3672-43E7-9A16-0CD0E3690E2B}" type="datetimeFigureOut">
               <a:rPr lang="fr-FR" smtClean="0"/>
-              <a:t>04/11/2025</a:t>
+              <a:t>09/11/2025</a:t>
             </a:fld>
             <a:endParaRPr lang="fr-FR"/>
           </a:p>
@@ -2346,7 +2354,7 @@
           <a:p>
             <a:fld id="{2FB4C272-3672-43E7-9A16-0CD0E3690E2B}" type="datetimeFigureOut">
               <a:rPr lang="fr-FR" smtClean="0"/>
-              <a:t>04/11/2025</a:t>
+              <a:t>09/11/2025</a:t>
             </a:fld>
             <a:endParaRPr lang="fr-FR"/>
           </a:p>
@@ -2559,7 +2567,7 @@
           <a:p>
             <a:fld id="{2FB4C272-3672-43E7-9A16-0CD0E3690E2B}" type="datetimeFigureOut">
               <a:rPr lang="fr-FR" smtClean="0"/>
-              <a:t>04/11/2025</a:t>
+              <a:t>09/11/2025</a:t>
             </a:fld>
             <a:endParaRPr lang="fr-FR"/>
           </a:p>
@@ -3857,6 +3865,549 @@
 </p:sld>
 </file>
 
+<file path=ppt/slides/slide2.xml><?xml version="1.0" encoding="utf-8"?>
+<p:sld xmlns:a="http://schemas.openxmlformats.org/drawingml/2006/main" xmlns:r="http://schemas.openxmlformats.org/officeDocument/2006/relationships" xmlns:p="http://schemas.openxmlformats.org/presentationml/2006/main">
+  <p:cSld>
+    <p:spTree>
+      <p:nvGrpSpPr>
+        <p:cNvPr id="1" name=""/>
+        <p:cNvGrpSpPr/>
+        <p:nvPr/>
+      </p:nvGrpSpPr>
+      <p:grpSpPr>
+        <a:xfrm>
+          <a:off x="0" y="0"/>
+          <a:ext cx="0" cy="0"/>
+          <a:chOff x="0" y="0"/>
+          <a:chExt cx="0" cy="0"/>
+        </a:xfrm>
+      </p:grpSpPr>
+      <p:pic>
+        <p:nvPicPr>
+          <p:cNvPr id="2" name="Image 1"/>
+          <p:cNvPicPr>
+            <a:picLocks noChangeAspect="1"/>
+          </p:cNvPicPr>
+          <p:nvPr/>
+        </p:nvPicPr>
+        <p:blipFill>
+          <a:blip r:embed="rId2"/>
+          <a:stretch>
+            <a:fillRect/>
+          </a:stretch>
+        </p:blipFill>
+        <p:spPr>
+          <a:xfrm>
+            <a:off x="506976" y="1234191"/>
+            <a:ext cx="5555461" cy="1996613"/>
+          </a:xfrm>
+          <a:prstGeom prst="rect">
+            <a:avLst/>
+          </a:prstGeom>
+        </p:spPr>
+      </p:pic>
+      <p:sp>
+        <p:nvSpPr>
+          <p:cNvPr id="3" name="ZoneTexte 2"/>
+          <p:cNvSpPr txBox="1"/>
+          <p:nvPr/>
+        </p:nvSpPr>
+        <p:spPr>
+          <a:xfrm>
+            <a:off x="758757" y="544749"/>
+            <a:ext cx="1682886" cy="369332"/>
+          </a:xfrm>
+          <a:prstGeom prst="rect">
+            <a:avLst/>
+          </a:prstGeom>
+          <a:noFill/>
+        </p:spPr>
+        <p:txBody>
+          <a:bodyPr wrap="square" rtlCol="0">
+            <a:spAutoFit/>
+          </a:bodyPr>
+          <a:lstStyle/>
+          <a:p>
+            <a:r>
+              <a:rPr lang="fr-FR" dirty="0" smtClean="0">
+                <a:solidFill>
+                  <a:schemeClr val="accent6">
+                    <a:lumMod val="75000"/>
+                  </a:schemeClr>
+                </a:solidFill>
+                <a:latin typeface="Maison Neue" panose="02000000000000000000" pitchFamily="2" charset="0"/>
+              </a:rPr>
+              <a:t>Equation B.11</a:t>
+            </a:r>
+            <a:endParaRPr lang="fr-FR" dirty="0">
+              <a:solidFill>
+                <a:schemeClr val="accent6">
+                  <a:lumMod val="75000"/>
+                </a:schemeClr>
+              </a:solidFill>
+              <a:latin typeface="Maison Neue" panose="02000000000000000000" pitchFamily="2" charset="0"/>
+            </a:endParaRPr>
+          </a:p>
+        </p:txBody>
+      </p:sp>
+      <p:pic>
+        <p:nvPicPr>
+          <p:cNvPr id="4" name="Image 3"/>
+          <p:cNvPicPr>
+            <a:picLocks noChangeAspect="1"/>
+          </p:cNvPicPr>
+          <p:nvPr/>
+        </p:nvPicPr>
+        <p:blipFill>
+          <a:blip r:embed="rId3"/>
+          <a:stretch>
+            <a:fillRect/>
+          </a:stretch>
+        </p:blipFill>
+        <p:spPr>
+          <a:xfrm>
+            <a:off x="1062475" y="4366990"/>
+            <a:ext cx="4953429" cy="1859441"/>
+          </a:xfrm>
+          <a:prstGeom prst="rect">
+            <a:avLst/>
+          </a:prstGeom>
+        </p:spPr>
+      </p:pic>
+      <p:sp>
+        <p:nvSpPr>
+          <p:cNvPr id="22" name="ZoneTexte 21"/>
+          <p:cNvSpPr txBox="1"/>
+          <p:nvPr/>
+        </p:nvSpPr>
+        <p:spPr>
+          <a:xfrm>
+            <a:off x="758757" y="3683540"/>
+            <a:ext cx="1682886" cy="369332"/>
+          </a:xfrm>
+          <a:prstGeom prst="rect">
+            <a:avLst/>
+          </a:prstGeom>
+          <a:noFill/>
+        </p:spPr>
+        <p:txBody>
+          <a:bodyPr wrap="square" rtlCol="0">
+            <a:spAutoFit/>
+          </a:bodyPr>
+          <a:lstStyle/>
+          <a:p>
+            <a:r>
+              <a:rPr lang="fr-FR" dirty="0" smtClean="0">
+                <a:solidFill>
+                  <a:schemeClr val="accent6">
+                    <a:lumMod val="75000"/>
+                  </a:schemeClr>
+                </a:solidFill>
+                <a:latin typeface="Maison Neue" panose="02000000000000000000" pitchFamily="2" charset="0"/>
+              </a:rPr>
+              <a:t>Equation B.17</a:t>
+            </a:r>
+            <a:endParaRPr lang="fr-FR" dirty="0">
+              <a:solidFill>
+                <a:schemeClr val="accent6">
+                  <a:lumMod val="75000"/>
+                </a:schemeClr>
+              </a:solidFill>
+              <a:latin typeface="Maison Neue" panose="02000000000000000000" pitchFamily="2" charset="0"/>
+            </a:endParaRPr>
+          </a:p>
+        </p:txBody>
+      </p:sp>
+      <p:pic>
+        <p:nvPicPr>
+          <p:cNvPr id="5" name="Image 4"/>
+          <p:cNvPicPr>
+            <a:picLocks noChangeAspect="1"/>
+          </p:cNvPicPr>
+          <p:nvPr/>
+        </p:nvPicPr>
+        <p:blipFill>
+          <a:blip r:embed="rId4"/>
+          <a:stretch>
+            <a:fillRect/>
+          </a:stretch>
+        </p:blipFill>
+        <p:spPr>
+          <a:xfrm>
+            <a:off x="6417533" y="3106986"/>
+            <a:ext cx="4823878" cy="1295512"/>
+          </a:xfrm>
+          <a:prstGeom prst="rect">
+            <a:avLst/>
+          </a:prstGeom>
+        </p:spPr>
+      </p:pic>
+      <p:pic>
+        <p:nvPicPr>
+          <p:cNvPr id="7" name="Image 6"/>
+          <p:cNvPicPr>
+            <a:picLocks noChangeAspect="1"/>
+          </p:cNvPicPr>
+          <p:nvPr/>
+        </p:nvPicPr>
+        <p:blipFill>
+          <a:blip r:embed="rId5"/>
+          <a:stretch>
+            <a:fillRect/>
+          </a:stretch>
+        </p:blipFill>
+        <p:spPr>
+          <a:xfrm>
+            <a:off x="6525335" y="5064822"/>
+            <a:ext cx="3246401" cy="1066892"/>
+          </a:xfrm>
+          <a:prstGeom prst="rect">
+            <a:avLst/>
+          </a:prstGeom>
+        </p:spPr>
+      </p:pic>
+      <p:pic>
+        <p:nvPicPr>
+          <p:cNvPr id="9" name="Image 8"/>
+          <p:cNvPicPr>
+            <a:picLocks noChangeAspect="1"/>
+          </p:cNvPicPr>
+          <p:nvPr/>
+        </p:nvPicPr>
+        <p:blipFill>
+          <a:blip r:embed="rId6"/>
+          <a:stretch>
+            <a:fillRect/>
+          </a:stretch>
+        </p:blipFill>
+        <p:spPr>
+          <a:xfrm>
+            <a:off x="6417533" y="1256204"/>
+            <a:ext cx="3010161" cy="952583"/>
+          </a:xfrm>
+          <a:prstGeom prst="rect">
+            <a:avLst/>
+          </a:prstGeom>
+        </p:spPr>
+      </p:pic>
+    </p:spTree>
+    <p:extLst>
+      <p:ext uri="{BB962C8B-B14F-4D97-AF65-F5344CB8AC3E}">
+        <p14:creationId xmlns:p14="http://schemas.microsoft.com/office/powerpoint/2010/main" val="2264331271"/>
+      </p:ext>
+    </p:extLst>
+  </p:cSld>
+  <p:clrMapOvr>
+    <a:masterClrMapping/>
+  </p:clrMapOvr>
+</p:sld>
+</file>
+
+<file path=ppt/slides/slide3.xml><?xml version="1.0" encoding="utf-8"?>
+<p:sld xmlns:a="http://schemas.openxmlformats.org/drawingml/2006/main" xmlns:r="http://schemas.openxmlformats.org/officeDocument/2006/relationships" xmlns:p="http://schemas.openxmlformats.org/presentationml/2006/main">
+  <p:cSld>
+    <p:spTree>
+      <p:nvGrpSpPr>
+        <p:cNvPr id="1" name=""/>
+        <p:cNvGrpSpPr/>
+        <p:nvPr/>
+      </p:nvGrpSpPr>
+      <p:grpSpPr>
+        <a:xfrm>
+          <a:off x="0" y="0"/>
+          <a:ext cx="0" cy="0"/>
+          <a:chOff x="0" y="0"/>
+          <a:chExt cx="0" cy="0"/>
+        </a:xfrm>
+      </p:grpSpPr>
+      <p:pic>
+        <p:nvPicPr>
+          <p:cNvPr id="4" name="Image 3"/>
+          <p:cNvPicPr>
+            <a:picLocks noChangeAspect="1"/>
+          </p:cNvPicPr>
+          <p:nvPr/>
+        </p:nvPicPr>
+        <p:blipFill>
+          <a:blip r:embed="rId2"/>
+          <a:stretch>
+            <a:fillRect/>
+          </a:stretch>
+        </p:blipFill>
+        <p:spPr>
+          <a:xfrm>
+            <a:off x="1051123" y="564376"/>
+            <a:ext cx="5044877" cy="3436918"/>
+          </a:xfrm>
+          <a:prstGeom prst="rect">
+            <a:avLst/>
+          </a:prstGeom>
+        </p:spPr>
+      </p:pic>
+      <p:pic>
+        <p:nvPicPr>
+          <p:cNvPr id="5" name="Image 4"/>
+          <p:cNvPicPr>
+            <a:picLocks noChangeAspect="1"/>
+          </p:cNvPicPr>
+          <p:nvPr/>
+        </p:nvPicPr>
+        <p:blipFill>
+          <a:blip r:embed="rId3"/>
+          <a:stretch>
+            <a:fillRect/>
+          </a:stretch>
+        </p:blipFill>
+        <p:spPr>
+          <a:xfrm>
+            <a:off x="1214966" y="4136231"/>
+            <a:ext cx="4717189" cy="701101"/>
+          </a:xfrm>
+          <a:prstGeom prst="rect">
+            <a:avLst/>
+          </a:prstGeom>
+        </p:spPr>
+      </p:pic>
+    </p:spTree>
+    <p:extLst>
+      <p:ext uri="{BB962C8B-B14F-4D97-AF65-F5344CB8AC3E}">
+        <p14:creationId xmlns:p14="http://schemas.microsoft.com/office/powerpoint/2010/main" val="211859637"/>
+      </p:ext>
+    </p:extLst>
+  </p:cSld>
+  <p:clrMapOvr>
+    <a:masterClrMapping/>
+  </p:clrMapOvr>
+</p:sld>
+</file>
+
+<file path=ppt/slides/slide4.xml><?xml version="1.0" encoding="utf-8"?>
+<p:sld xmlns:a="http://schemas.openxmlformats.org/drawingml/2006/main" xmlns:r="http://schemas.openxmlformats.org/officeDocument/2006/relationships" xmlns:p="http://schemas.openxmlformats.org/presentationml/2006/main">
+  <p:cSld>
+    <p:spTree>
+      <p:nvGrpSpPr>
+        <p:cNvPr id="1" name=""/>
+        <p:cNvGrpSpPr/>
+        <p:nvPr/>
+      </p:nvGrpSpPr>
+      <p:grpSpPr>
+        <a:xfrm>
+          <a:off x="0" y="0"/>
+          <a:ext cx="0" cy="0"/>
+          <a:chOff x="0" y="0"/>
+          <a:chExt cx="0" cy="0"/>
+        </a:xfrm>
+      </p:grpSpPr>
+      <p:sp>
+        <p:nvSpPr>
+          <p:cNvPr id="4" name="ZoneTexte 3"/>
+          <p:cNvSpPr txBox="1"/>
+          <p:nvPr/>
+        </p:nvSpPr>
+        <p:spPr>
+          <a:xfrm>
+            <a:off x="758756" y="544749"/>
+            <a:ext cx="3167067" cy="369332"/>
+          </a:xfrm>
+          <a:prstGeom prst="rect">
+            <a:avLst/>
+          </a:prstGeom>
+          <a:noFill/>
+        </p:spPr>
+        <p:txBody>
+          <a:bodyPr wrap="square" rtlCol="0">
+            <a:spAutoFit/>
+          </a:bodyPr>
+          <a:lstStyle/>
+          <a:p>
+            <a:r>
+              <a:rPr lang="fr-FR" dirty="0" smtClean="0">
+                <a:solidFill>
+                  <a:schemeClr val="accent6">
+                    <a:lumMod val="75000"/>
+                  </a:schemeClr>
+                </a:solidFill>
+                <a:latin typeface="Maison Neue" panose="02000000000000000000" pitchFamily="2" charset="0"/>
+              </a:rPr>
+              <a:t>Structures bitumineuses</a:t>
+            </a:r>
+            <a:endParaRPr lang="fr-FR" dirty="0">
+              <a:solidFill>
+                <a:schemeClr val="accent6">
+                  <a:lumMod val="75000"/>
+                </a:schemeClr>
+              </a:solidFill>
+              <a:latin typeface="Maison Neue" panose="02000000000000000000" pitchFamily="2" charset="0"/>
+            </a:endParaRPr>
+          </a:p>
+        </p:txBody>
+      </p:sp>
+      <p:grpSp>
+        <p:nvGrpSpPr>
+          <p:cNvPr id="7" name="Groupe 6"/>
+          <p:cNvGrpSpPr/>
+          <p:nvPr/>
+        </p:nvGrpSpPr>
+        <p:grpSpPr>
+          <a:xfrm>
+            <a:off x="665227" y="1054609"/>
+            <a:ext cx="5430774" cy="1735072"/>
+            <a:chOff x="595145" y="1487424"/>
+            <a:chExt cx="7204665" cy="2356865"/>
+          </a:xfrm>
+        </p:grpSpPr>
+        <p:pic>
+          <p:nvPicPr>
+            <p:cNvPr id="5" name="Image 4"/>
+            <p:cNvPicPr>
+              <a:picLocks noChangeAspect="1"/>
+            </p:cNvPicPr>
+            <p:nvPr/>
+          </p:nvPicPr>
+          <p:blipFill rotWithShape="1">
+            <a:blip r:embed="rId2"/>
+            <a:srcRect t="22309"/>
+            <a:stretch/>
+          </p:blipFill>
+          <p:spPr>
+            <a:xfrm>
+              <a:off x="595145" y="1487424"/>
+              <a:ext cx="7152381" cy="1206057"/>
+            </a:xfrm>
+            <a:prstGeom prst="rect">
+              <a:avLst/>
+            </a:prstGeom>
+          </p:spPr>
+        </p:pic>
+        <p:pic>
+          <p:nvPicPr>
+            <p:cNvPr id="6" name="Image 5"/>
+            <p:cNvPicPr>
+              <a:picLocks noChangeAspect="1"/>
+            </p:cNvPicPr>
+            <p:nvPr/>
+          </p:nvPicPr>
+          <p:blipFill rotWithShape="1">
+            <a:blip r:embed="rId3"/>
+            <a:srcRect t="15447"/>
+            <a:stretch/>
+          </p:blipFill>
+          <p:spPr>
+            <a:xfrm>
+              <a:off x="733143" y="2588075"/>
+              <a:ext cx="7066667" cy="1256214"/>
+            </a:xfrm>
+            <a:prstGeom prst="rect">
+              <a:avLst/>
+            </a:prstGeom>
+          </p:spPr>
+        </p:pic>
+      </p:grpSp>
+      <p:pic>
+        <p:nvPicPr>
+          <p:cNvPr id="8" name="Image 7"/>
+          <p:cNvPicPr>
+            <a:picLocks noChangeAspect="1"/>
+          </p:cNvPicPr>
+          <p:nvPr/>
+        </p:nvPicPr>
+        <p:blipFill>
+          <a:blip r:embed="rId4"/>
+          <a:stretch>
+            <a:fillRect/>
+          </a:stretch>
+        </p:blipFill>
+        <p:spPr>
+          <a:xfrm>
+            <a:off x="769248" y="2943962"/>
+            <a:ext cx="5147975" cy="3463053"/>
+          </a:xfrm>
+          <a:prstGeom prst="rect">
+            <a:avLst/>
+          </a:prstGeom>
+        </p:spPr>
+      </p:pic>
+      <p:sp>
+        <p:nvSpPr>
+          <p:cNvPr id="9" name="ZoneTexte 8"/>
+          <p:cNvSpPr txBox="1"/>
+          <p:nvPr/>
+        </p:nvSpPr>
+        <p:spPr>
+          <a:xfrm>
+            <a:off x="6573402" y="544749"/>
+            <a:ext cx="3167067" cy="369332"/>
+          </a:xfrm>
+          <a:prstGeom prst="rect">
+            <a:avLst/>
+          </a:prstGeom>
+          <a:noFill/>
+        </p:spPr>
+        <p:txBody>
+          <a:bodyPr wrap="square" rtlCol="0">
+            <a:spAutoFit/>
+          </a:bodyPr>
+          <a:lstStyle/>
+          <a:p>
+            <a:r>
+              <a:rPr lang="fr-FR" dirty="0" smtClean="0">
+                <a:solidFill>
+                  <a:schemeClr val="accent6">
+                    <a:lumMod val="75000"/>
+                  </a:schemeClr>
+                </a:solidFill>
+                <a:latin typeface="Maison Neue" panose="02000000000000000000" pitchFamily="2" charset="0"/>
+              </a:rPr>
+              <a:t>Structures rigides</a:t>
+            </a:r>
+            <a:endParaRPr lang="fr-FR" dirty="0">
+              <a:solidFill>
+                <a:schemeClr val="accent6">
+                  <a:lumMod val="75000"/>
+                </a:schemeClr>
+              </a:solidFill>
+              <a:latin typeface="Maison Neue" panose="02000000000000000000" pitchFamily="2" charset="0"/>
+            </a:endParaRPr>
+          </a:p>
+        </p:txBody>
+      </p:sp>
+      <p:pic>
+        <p:nvPicPr>
+          <p:cNvPr id="10" name="Image 9"/>
+          <p:cNvPicPr>
+            <a:picLocks noChangeAspect="1"/>
+          </p:cNvPicPr>
+          <p:nvPr/>
+        </p:nvPicPr>
+        <p:blipFill>
+          <a:blip r:embed="rId5"/>
+          <a:stretch>
+            <a:fillRect/>
+          </a:stretch>
+        </p:blipFill>
+        <p:spPr>
+          <a:xfrm>
+            <a:off x="6296713" y="1054609"/>
+            <a:ext cx="5295811" cy="3962753"/>
+          </a:xfrm>
+          <a:prstGeom prst="rect">
+            <a:avLst/>
+          </a:prstGeom>
+        </p:spPr>
+      </p:pic>
+    </p:spTree>
+    <p:extLst>
+      <p:ext uri="{BB962C8B-B14F-4D97-AF65-F5344CB8AC3E}">
+        <p14:creationId xmlns:p14="http://schemas.microsoft.com/office/powerpoint/2010/main" val="4185124960"/>
+      </p:ext>
+    </p:extLst>
+  </p:cSld>
+  <p:clrMapOvr>
+    <a:masterClrMapping/>
+  </p:clrMapOvr>
+</p:sld>
+</file>
+
 <file path=ppt/theme/theme1.xml><?xml version="1.0" encoding="utf-8"?>
 <a:theme xmlns:a="http://schemas.openxmlformats.org/drawingml/2006/main" name="Thème Office">
   <a:themeElements>
@@ -4119,6 +4670,23 @@
 </file>
 
 <file path=customXml/item1.xml><?xml version="1.0" encoding="utf-8"?>
+<p:properties xmlns:p="http://schemas.microsoft.com/office/2006/metadata/properties" xmlns:xsi="http://www.w3.org/2001/XMLSchema-instance" xmlns:pc="http://schemas.microsoft.com/office/infopath/2007/PartnerControls">
+  <documentManagement>
+    <_activity xmlns="e1a1d82c-0992-4cb8-94d7-7f7c4d36b294" xsi:nil="true"/>
+  </documentManagement>
+</p:properties>
+</file>
+
+<file path=customXml/item2.xml><?xml version="1.0" encoding="utf-8"?>
+<?mso-contentType ?>
+<FormTemplates xmlns="http://schemas.microsoft.com/sharepoint/v3/contenttype/forms">
+  <Display>DocumentLibraryForm</Display>
+  <Edit>DocumentLibraryForm</Edit>
+  <New>DocumentLibraryForm</New>
+</FormTemplates>
+</file>
+
+<file path=customXml/item3.xml><?xml version="1.0" encoding="utf-8"?>
 <ct:contentTypeSchema xmlns:ct="http://schemas.microsoft.com/office/2006/metadata/contentType" xmlns:ma="http://schemas.microsoft.com/office/2006/metadata/properties/metaAttributes" ct:_="" ma:_="" ma:contentTypeName="Document" ma:contentTypeID="0x0101006EBFA0175B84CD499F1873057EBA1484" ma:contentTypeVersion="16" ma:contentTypeDescription="Crée un document." ma:contentTypeScope="" ma:versionID="af713182e7221dd8e6b5b28ac3837aba">
   <xsd:schema xmlns:xsd="http://www.w3.org/2001/XMLSchema" xmlns:xs="http://www.w3.org/2001/XMLSchema" xmlns:p="http://schemas.microsoft.com/office/2006/metadata/properties" xmlns:ns3="e1a1d82c-0992-4cb8-94d7-7f7c4d36b294" xmlns:ns4="140a38ea-9f47-4842-81d5-06b0dd2885bf" targetNamespace="http://schemas.microsoft.com/office/2006/metadata/properties" ma:root="true" ma:fieldsID="5676d41fc277946a0ecd776292066b3f" ns3:_="" ns4:_="">
     <xsd:import namespace="e1a1d82c-0992-4cb8-94d7-7f7c4d36b294"/>
@@ -4357,24 +4925,32 @@
 </ct:contentTypeSchema>
 </file>
 
-<file path=customXml/item2.xml><?xml version="1.0" encoding="utf-8"?>
-<?mso-contentType ?>
-<FormTemplates xmlns="http://schemas.microsoft.com/sharepoint/v3/contenttype/forms">
-  <Display>DocumentLibraryForm</Display>
-  <Edit>DocumentLibraryForm</Edit>
-  <New>DocumentLibraryForm</New>
-</FormTemplates>
+<file path=customXml/itemProps1.xml><?xml version="1.0" encoding="utf-8"?>
+<ds:datastoreItem xmlns:ds="http://schemas.openxmlformats.org/officeDocument/2006/customXml" ds:itemID="{C8A97D56-E45D-459A-BADC-382BA4C85AD7}">
+  <ds:schemaRefs>
+    <ds:schemaRef ds:uri="http://purl.org/dc/terms/"/>
+    <ds:schemaRef ds:uri="http://schemas.openxmlformats.org/package/2006/metadata/core-properties"/>
+    <ds:schemaRef ds:uri="http://schemas.microsoft.com/office/2006/documentManagement/types"/>
+    <ds:schemaRef ds:uri="http://purl.org/dc/dcmitype/"/>
+    <ds:schemaRef ds:uri="http://schemas.microsoft.com/office/infopath/2007/PartnerControls"/>
+    <ds:schemaRef ds:uri="http://purl.org/dc/elements/1.1/"/>
+    <ds:schemaRef ds:uri="http://schemas.microsoft.com/office/2006/metadata/properties"/>
+    <ds:schemaRef ds:uri="140a38ea-9f47-4842-81d5-06b0dd2885bf"/>
+    <ds:schemaRef ds:uri="e1a1d82c-0992-4cb8-94d7-7f7c4d36b294"/>
+    <ds:schemaRef ds:uri="http://www.w3.org/XML/1998/namespace"/>
+  </ds:schemaRefs>
+</ds:datastoreItem>
 </file>
 
-<file path=customXml/item3.xml><?xml version="1.0" encoding="utf-8"?>
-<p:properties xmlns:p="http://schemas.microsoft.com/office/2006/metadata/properties" xmlns:xsi="http://www.w3.org/2001/XMLSchema-instance" xmlns:pc="http://schemas.microsoft.com/office/infopath/2007/PartnerControls">
-  <documentManagement>
-    <_activity xmlns="e1a1d82c-0992-4cb8-94d7-7f7c4d36b294" xsi:nil="true"/>
-  </documentManagement>
-</p:properties>
+<file path=customXml/itemProps2.xml><?xml version="1.0" encoding="utf-8"?>
+<ds:datastoreItem xmlns:ds="http://schemas.openxmlformats.org/officeDocument/2006/customXml" ds:itemID="{129DA455-99A3-45D6-8AB4-E6DB214BB793}">
+  <ds:schemaRefs>
+    <ds:schemaRef ds:uri="http://schemas.microsoft.com/sharepoint/v3/contenttype/forms"/>
+  </ds:schemaRefs>
+</ds:datastoreItem>
 </file>
 
-<file path=customXml/itemProps1.xml><?xml version="1.0" encoding="utf-8"?>
+<file path=customXml/itemProps3.xml><?xml version="1.0" encoding="utf-8"?>
 <ds:datastoreItem xmlns:ds="http://schemas.openxmlformats.org/officeDocument/2006/customXml" ds:itemID="{66995176-3B9A-4366-8C5E-29937C64D05A}">
   <ds:schemaRefs>
     <ds:schemaRef ds:uri="http://schemas.microsoft.com/office/2006/metadata/contentType"/>
@@ -4391,29 +4967,4 @@
     <ds:schemaRef ds:uri="http://schemas.microsoft.com/internal/obd"/>
   </ds:schemaRefs>
 </ds:datastoreItem>
-</file>
-
-<file path=customXml/itemProps2.xml><?xml version="1.0" encoding="utf-8"?>
-<ds:datastoreItem xmlns:ds="http://schemas.openxmlformats.org/officeDocument/2006/customXml" ds:itemID="{129DA455-99A3-45D6-8AB4-E6DB214BB793}">
-  <ds:schemaRefs>
-    <ds:schemaRef ds:uri="http://schemas.microsoft.com/sharepoint/v3/contenttype/forms"/>
-  </ds:schemaRefs>
-</ds:datastoreItem>
-</file>
-
-<file path=customXml/itemProps3.xml><?xml version="1.0" encoding="utf-8"?>
-<ds:datastoreItem xmlns:ds="http://schemas.openxmlformats.org/officeDocument/2006/customXml" ds:itemID="{C8A97D56-E45D-459A-BADC-382BA4C85AD7}">
-  <ds:schemaRefs>
-    <ds:schemaRef ds:uri="http://purl.org/dc/elements/1.1/"/>
-    <ds:schemaRef ds:uri="http://schemas.microsoft.com/office/2006/metadata/properties"/>
-    <ds:schemaRef ds:uri="140a38ea-9f47-4842-81d5-06b0dd2885bf"/>
-    <ds:schemaRef ds:uri="http://purl.org/dc/terms/"/>
-    <ds:schemaRef ds:uri="http://schemas.openxmlformats.org/package/2006/metadata/core-properties"/>
-    <ds:schemaRef ds:uri="e1a1d82c-0992-4cb8-94d7-7f7c4d36b294"/>
-    <ds:schemaRef ds:uri="http://schemas.microsoft.com/office/2006/documentManagement/types"/>
-    <ds:schemaRef ds:uri="http://schemas.microsoft.com/office/infopath/2007/PartnerControls"/>
-    <ds:schemaRef ds:uri="http://www.w3.org/XML/1998/namespace"/>
-    <ds:schemaRef ds:uri="http://purl.org/dc/dcmitype/"/>
-  </ds:schemaRefs>
-</ds:datastoreItem>
 </file>
</xml_diff>

<commit_message>
correct some stuff on calculation
</commit_message>
<xml_diff>
--- a/docs/principes_burmister.pptx
+++ b/docs/principes_burmister.pptx
@@ -8,10 +8,11 @@
     <p:sldId id="256" r:id="rId5"/>
     <p:sldId id="257" r:id="rId6"/>
     <p:sldId id="258" r:id="rId7"/>
-    <p:sldId id="259" r:id="rId8"/>
+    <p:sldId id="260" r:id="rId8"/>
+    <p:sldId id="259" r:id="rId9"/>
   </p:sldIdLst>
   <p:sldSz cx="12192000" cy="6858000"/>
-  <p:notesSz cx="7099300" cy="10234613"/>
+  <p:notesSz cx="6735763" cy="9869488"/>
   <p:defaultTextStyle>
     <a:defPPr>
       <a:defRPr lang="fr-FR"/>
@@ -246,7 +247,7 @@
           <a:p>
             <a:fld id="{2FB4C272-3672-43E7-9A16-0CD0E3690E2B}" type="datetimeFigureOut">
               <a:rPr lang="fr-FR" smtClean="0"/>
-              <a:t>09/11/2025</a:t>
+              <a:t>12/11/2025</a:t>
             </a:fld>
             <a:endParaRPr lang="fr-FR"/>
           </a:p>
@@ -416,7 +417,7 @@
           <a:p>
             <a:fld id="{2FB4C272-3672-43E7-9A16-0CD0E3690E2B}" type="datetimeFigureOut">
               <a:rPr lang="fr-FR" smtClean="0"/>
-              <a:t>09/11/2025</a:t>
+              <a:t>12/11/2025</a:t>
             </a:fld>
             <a:endParaRPr lang="fr-FR"/>
           </a:p>
@@ -596,7 +597,7 @@
           <a:p>
             <a:fld id="{2FB4C272-3672-43E7-9A16-0CD0E3690E2B}" type="datetimeFigureOut">
               <a:rPr lang="fr-FR" smtClean="0"/>
-              <a:t>09/11/2025</a:t>
+              <a:t>12/11/2025</a:t>
             </a:fld>
             <a:endParaRPr lang="fr-FR"/>
           </a:p>
@@ -766,7 +767,7 @@
           <a:p>
             <a:fld id="{2FB4C272-3672-43E7-9A16-0CD0E3690E2B}" type="datetimeFigureOut">
               <a:rPr lang="fr-FR" smtClean="0"/>
-              <a:t>09/11/2025</a:t>
+              <a:t>12/11/2025</a:t>
             </a:fld>
             <a:endParaRPr lang="fr-FR"/>
           </a:p>
@@ -1012,7 +1013,7 @@
           <a:p>
             <a:fld id="{2FB4C272-3672-43E7-9A16-0CD0E3690E2B}" type="datetimeFigureOut">
               <a:rPr lang="fr-FR" smtClean="0"/>
-              <a:t>09/11/2025</a:t>
+              <a:t>12/11/2025</a:t>
             </a:fld>
             <a:endParaRPr lang="fr-FR"/>
           </a:p>
@@ -1244,7 +1245,7 @@
           <a:p>
             <a:fld id="{2FB4C272-3672-43E7-9A16-0CD0E3690E2B}" type="datetimeFigureOut">
               <a:rPr lang="fr-FR" smtClean="0"/>
-              <a:t>09/11/2025</a:t>
+              <a:t>12/11/2025</a:t>
             </a:fld>
             <a:endParaRPr lang="fr-FR"/>
           </a:p>
@@ -1611,7 +1612,7 @@
           <a:p>
             <a:fld id="{2FB4C272-3672-43E7-9A16-0CD0E3690E2B}" type="datetimeFigureOut">
               <a:rPr lang="fr-FR" smtClean="0"/>
-              <a:t>09/11/2025</a:t>
+              <a:t>12/11/2025</a:t>
             </a:fld>
             <a:endParaRPr lang="fr-FR"/>
           </a:p>
@@ -1729,7 +1730,7 @@
           <a:p>
             <a:fld id="{2FB4C272-3672-43E7-9A16-0CD0E3690E2B}" type="datetimeFigureOut">
               <a:rPr lang="fr-FR" smtClean="0"/>
-              <a:t>09/11/2025</a:t>
+              <a:t>12/11/2025</a:t>
             </a:fld>
             <a:endParaRPr lang="fr-FR"/>
           </a:p>
@@ -1824,7 +1825,7 @@
           <a:p>
             <a:fld id="{2FB4C272-3672-43E7-9A16-0CD0E3690E2B}" type="datetimeFigureOut">
               <a:rPr lang="fr-FR" smtClean="0"/>
-              <a:t>09/11/2025</a:t>
+              <a:t>12/11/2025</a:t>
             </a:fld>
             <a:endParaRPr lang="fr-FR"/>
           </a:p>
@@ -2101,7 +2102,7 @@
           <a:p>
             <a:fld id="{2FB4C272-3672-43E7-9A16-0CD0E3690E2B}" type="datetimeFigureOut">
               <a:rPr lang="fr-FR" smtClean="0"/>
-              <a:t>09/11/2025</a:t>
+              <a:t>12/11/2025</a:t>
             </a:fld>
             <a:endParaRPr lang="fr-FR"/>
           </a:p>
@@ -2354,7 +2355,7 @@
           <a:p>
             <a:fld id="{2FB4C272-3672-43E7-9A16-0CD0E3690E2B}" type="datetimeFigureOut">
               <a:rPr lang="fr-FR" smtClean="0"/>
-              <a:t>09/11/2025</a:t>
+              <a:t>12/11/2025</a:t>
             </a:fld>
             <a:endParaRPr lang="fr-FR"/>
           </a:p>
@@ -2567,7 +2568,7 @@
           <a:p>
             <a:fld id="{2FB4C272-3672-43E7-9A16-0CD0E3690E2B}" type="datetimeFigureOut">
               <a:rPr lang="fr-FR" smtClean="0"/>
-              <a:t>09/11/2025</a:t>
+              <a:t>12/11/2025</a:t>
             </a:fld>
             <a:endParaRPr lang="fr-FR"/>
           </a:p>
@@ -4198,6 +4199,108 @@
           <a:chExt cx="0" cy="0"/>
         </a:xfrm>
       </p:grpSpPr>
+      <p:pic>
+        <p:nvPicPr>
+          <p:cNvPr id="4" name="Image 3"/>
+          <p:cNvPicPr>
+            <a:picLocks noChangeAspect="1"/>
+          </p:cNvPicPr>
+          <p:nvPr/>
+        </p:nvPicPr>
+        <p:blipFill>
+          <a:blip r:embed="rId2"/>
+          <a:stretch>
+            <a:fillRect/>
+          </a:stretch>
+        </p:blipFill>
+        <p:spPr>
+          <a:xfrm>
+            <a:off x="1051123" y="564376"/>
+            <a:ext cx="5044877" cy="3436918"/>
+          </a:xfrm>
+          <a:prstGeom prst="rect">
+            <a:avLst/>
+          </a:prstGeom>
+        </p:spPr>
+      </p:pic>
+      <p:pic>
+        <p:nvPicPr>
+          <p:cNvPr id="5" name="Image 4"/>
+          <p:cNvPicPr>
+            <a:picLocks noChangeAspect="1"/>
+          </p:cNvPicPr>
+          <p:nvPr/>
+        </p:nvPicPr>
+        <p:blipFill>
+          <a:blip r:embed="rId3"/>
+          <a:stretch>
+            <a:fillRect/>
+          </a:stretch>
+        </p:blipFill>
+        <p:spPr>
+          <a:xfrm>
+            <a:off x="1214966" y="4136231"/>
+            <a:ext cx="4717189" cy="701101"/>
+          </a:xfrm>
+          <a:prstGeom prst="rect">
+            <a:avLst/>
+          </a:prstGeom>
+        </p:spPr>
+      </p:pic>
+      <p:pic>
+        <p:nvPicPr>
+          <p:cNvPr id="2" name="Image 1"/>
+          <p:cNvPicPr>
+            <a:picLocks noChangeAspect="1"/>
+          </p:cNvPicPr>
+          <p:nvPr/>
+        </p:nvPicPr>
+        <p:blipFill>
+          <a:blip r:embed="rId4"/>
+          <a:stretch>
+            <a:fillRect/>
+          </a:stretch>
+        </p:blipFill>
+        <p:spPr>
+          <a:xfrm>
+            <a:off x="7811663" y="1426757"/>
+            <a:ext cx="1511378" cy="717587"/>
+          </a:xfrm>
+          <a:prstGeom prst="rect">
+            <a:avLst/>
+          </a:prstGeom>
+        </p:spPr>
+      </p:pic>
+    </p:spTree>
+    <p:extLst>
+      <p:ext uri="{BB962C8B-B14F-4D97-AF65-F5344CB8AC3E}">
+        <p14:creationId xmlns:p14="http://schemas.microsoft.com/office/powerpoint/2010/main" val="128394062"/>
+      </p:ext>
+    </p:extLst>
+  </p:cSld>
+  <p:clrMapOvr>
+    <a:masterClrMapping/>
+  </p:clrMapOvr>
+</p:sld>
+</file>
+
+<file path=ppt/slides/slide5.xml><?xml version="1.0" encoding="utf-8"?>
+<p:sld xmlns:a="http://schemas.openxmlformats.org/drawingml/2006/main" xmlns:r="http://schemas.openxmlformats.org/officeDocument/2006/relationships" xmlns:p="http://schemas.openxmlformats.org/presentationml/2006/main">
+  <p:cSld>
+    <p:spTree>
+      <p:nvGrpSpPr>
+        <p:cNvPr id="1" name=""/>
+        <p:cNvGrpSpPr/>
+        <p:nvPr/>
+      </p:nvGrpSpPr>
+      <p:grpSpPr>
+        <a:xfrm>
+          <a:off x="0" y="0"/>
+          <a:ext cx="0" cy="0"/>
+          <a:chOff x="0" y="0"/>
+          <a:chExt cx="0" cy="0"/>
+        </a:xfrm>
+      </p:grpSpPr>
       <p:sp>
         <p:nvSpPr>
           <p:cNvPr id="4" name="ZoneTexte 3"/>
@@ -4670,23 +4773,6 @@
 </file>
 
 <file path=customXml/item1.xml><?xml version="1.0" encoding="utf-8"?>
-<p:properties xmlns:p="http://schemas.microsoft.com/office/2006/metadata/properties" xmlns:xsi="http://www.w3.org/2001/XMLSchema-instance" xmlns:pc="http://schemas.microsoft.com/office/infopath/2007/PartnerControls">
-  <documentManagement>
-    <_activity xmlns="e1a1d82c-0992-4cb8-94d7-7f7c4d36b294" xsi:nil="true"/>
-  </documentManagement>
-</p:properties>
-</file>
-
-<file path=customXml/item2.xml><?xml version="1.0" encoding="utf-8"?>
-<?mso-contentType ?>
-<FormTemplates xmlns="http://schemas.microsoft.com/sharepoint/v3/contenttype/forms">
-  <Display>DocumentLibraryForm</Display>
-  <Edit>DocumentLibraryForm</Edit>
-  <New>DocumentLibraryForm</New>
-</FormTemplates>
-</file>
-
-<file path=customXml/item3.xml><?xml version="1.0" encoding="utf-8"?>
 <ct:contentTypeSchema xmlns:ct="http://schemas.microsoft.com/office/2006/metadata/contentType" xmlns:ma="http://schemas.microsoft.com/office/2006/metadata/properties/metaAttributes" ct:_="" ma:_="" ma:contentTypeName="Document" ma:contentTypeID="0x0101006EBFA0175B84CD499F1873057EBA1484" ma:contentTypeVersion="16" ma:contentTypeDescription="Crée un document." ma:contentTypeScope="" ma:versionID="af713182e7221dd8e6b5b28ac3837aba">
   <xsd:schema xmlns:xsd="http://www.w3.org/2001/XMLSchema" xmlns:xs="http://www.w3.org/2001/XMLSchema" xmlns:p="http://schemas.microsoft.com/office/2006/metadata/properties" xmlns:ns3="e1a1d82c-0992-4cb8-94d7-7f7c4d36b294" xmlns:ns4="140a38ea-9f47-4842-81d5-06b0dd2885bf" targetNamespace="http://schemas.microsoft.com/office/2006/metadata/properties" ma:root="true" ma:fieldsID="5676d41fc277946a0ecd776292066b3f" ns3:_="" ns4:_="">
     <xsd:import namespace="e1a1d82c-0992-4cb8-94d7-7f7c4d36b294"/>
@@ -4925,32 +5011,24 @@
 </ct:contentTypeSchema>
 </file>
 
-<file path=customXml/itemProps1.xml><?xml version="1.0" encoding="utf-8"?>
-<ds:datastoreItem xmlns:ds="http://schemas.openxmlformats.org/officeDocument/2006/customXml" ds:itemID="{C8A97D56-E45D-459A-BADC-382BA4C85AD7}">
-  <ds:schemaRefs>
-    <ds:schemaRef ds:uri="http://purl.org/dc/terms/"/>
-    <ds:schemaRef ds:uri="http://schemas.openxmlformats.org/package/2006/metadata/core-properties"/>
-    <ds:schemaRef ds:uri="http://schemas.microsoft.com/office/2006/documentManagement/types"/>
-    <ds:schemaRef ds:uri="http://purl.org/dc/dcmitype/"/>
-    <ds:schemaRef ds:uri="http://schemas.microsoft.com/office/infopath/2007/PartnerControls"/>
-    <ds:schemaRef ds:uri="http://purl.org/dc/elements/1.1/"/>
-    <ds:schemaRef ds:uri="http://schemas.microsoft.com/office/2006/metadata/properties"/>
-    <ds:schemaRef ds:uri="140a38ea-9f47-4842-81d5-06b0dd2885bf"/>
-    <ds:schemaRef ds:uri="e1a1d82c-0992-4cb8-94d7-7f7c4d36b294"/>
-    <ds:schemaRef ds:uri="http://www.w3.org/XML/1998/namespace"/>
-  </ds:schemaRefs>
-</ds:datastoreItem>
+<file path=customXml/item2.xml><?xml version="1.0" encoding="utf-8"?>
+<?mso-contentType ?>
+<FormTemplates xmlns="http://schemas.microsoft.com/sharepoint/v3/contenttype/forms">
+  <Display>DocumentLibraryForm</Display>
+  <Edit>DocumentLibraryForm</Edit>
+  <New>DocumentLibraryForm</New>
+</FormTemplates>
 </file>
 
-<file path=customXml/itemProps2.xml><?xml version="1.0" encoding="utf-8"?>
-<ds:datastoreItem xmlns:ds="http://schemas.openxmlformats.org/officeDocument/2006/customXml" ds:itemID="{129DA455-99A3-45D6-8AB4-E6DB214BB793}">
-  <ds:schemaRefs>
-    <ds:schemaRef ds:uri="http://schemas.microsoft.com/sharepoint/v3/contenttype/forms"/>
-  </ds:schemaRefs>
-</ds:datastoreItem>
+<file path=customXml/item3.xml><?xml version="1.0" encoding="utf-8"?>
+<p:properties xmlns:p="http://schemas.microsoft.com/office/2006/metadata/properties" xmlns:xsi="http://www.w3.org/2001/XMLSchema-instance" xmlns:pc="http://schemas.microsoft.com/office/infopath/2007/PartnerControls">
+  <documentManagement>
+    <_activity xmlns="e1a1d82c-0992-4cb8-94d7-7f7c4d36b294" xsi:nil="true"/>
+  </documentManagement>
+</p:properties>
 </file>
 
-<file path=customXml/itemProps3.xml><?xml version="1.0" encoding="utf-8"?>
+<file path=customXml/itemProps1.xml><?xml version="1.0" encoding="utf-8"?>
 <ds:datastoreItem xmlns:ds="http://schemas.openxmlformats.org/officeDocument/2006/customXml" ds:itemID="{66995176-3B9A-4366-8C5E-29937C64D05A}">
   <ds:schemaRefs>
     <ds:schemaRef ds:uri="http://schemas.microsoft.com/office/2006/metadata/contentType"/>
@@ -4967,4 +5045,29 @@
     <ds:schemaRef ds:uri="http://schemas.microsoft.com/internal/obd"/>
   </ds:schemaRefs>
 </ds:datastoreItem>
+</file>
+
+<file path=customXml/itemProps2.xml><?xml version="1.0" encoding="utf-8"?>
+<ds:datastoreItem xmlns:ds="http://schemas.openxmlformats.org/officeDocument/2006/customXml" ds:itemID="{129DA455-99A3-45D6-8AB4-E6DB214BB793}">
+  <ds:schemaRefs>
+    <ds:schemaRef ds:uri="http://schemas.microsoft.com/sharepoint/v3/contenttype/forms"/>
+  </ds:schemaRefs>
+</ds:datastoreItem>
+</file>
+
+<file path=customXml/itemProps3.xml><?xml version="1.0" encoding="utf-8"?>
+<ds:datastoreItem xmlns:ds="http://schemas.openxmlformats.org/officeDocument/2006/customXml" ds:itemID="{C8A97D56-E45D-459A-BADC-382BA4C85AD7}">
+  <ds:schemaRefs>
+    <ds:schemaRef ds:uri="e1a1d82c-0992-4cb8-94d7-7f7c4d36b294"/>
+    <ds:schemaRef ds:uri="http://purl.org/dc/dcmitype/"/>
+    <ds:schemaRef ds:uri="http://schemas.microsoft.com/office/infopath/2007/PartnerControls"/>
+    <ds:schemaRef ds:uri="http://schemas.microsoft.com/office/2006/documentManagement/types"/>
+    <ds:schemaRef ds:uri="http://purl.org/dc/elements/1.1/"/>
+    <ds:schemaRef ds:uri="http://schemas.microsoft.com/office/2006/metadata/properties"/>
+    <ds:schemaRef ds:uri="140a38ea-9f47-4842-81d5-06b0dd2885bf"/>
+    <ds:schemaRef ds:uri="http://purl.org/dc/terms/"/>
+    <ds:schemaRef ds:uri="http://schemas.openxmlformats.org/package/2006/metadata/core-properties"/>
+    <ds:schemaRef ds:uri="http://www.w3.org/XML/1998/namespace"/>
+  </ds:schemaRefs>
+</ds:datastoreItem>
 </file>
</xml_diff>